<commit_message>
Made changes to dissertation
</commit_message>
<xml_diff>
--- a/fig-proposal/C-code.pptx
+++ b/fig-proposal/C-code.pptx
@@ -7,8 +7,8 @@
   <p:sldIdLst>
     <p:sldId id="256" r:id="rId2"/>
   </p:sldIdLst>
-  <p:sldSz cx="2743200" cy="3932238"/>
-  <p:notesSz cx="6858000" cy="9144000"/>
+  <p:sldSz cx="2743200" cy="3429000"/>
+  <p:notesSz cx="7315200" cy="9601200"/>
   <p:defaultTextStyle>
     <a:defPPr>
       <a:defRPr lang="en-US"/>
@@ -104,6 +104,22 @@
       </a:defRPr>
     </a:lvl9pPr>
   </p:defaultTextStyle>
+  <p:extLst>
+    <p:ext uri="{EFAFB233-063F-42B5-8137-9DF3F51BA10A}">
+      <p15:sldGuideLst xmlns:p15="http://schemas.microsoft.com/office/powerpoint/2012/main">
+        <p15:guide id="1" orient="horz" pos="1080" userDrawn="1">
+          <p15:clr>
+            <a:srgbClr val="A4A3A4"/>
+          </p15:clr>
+        </p15:guide>
+        <p15:guide id="2" pos="864" userDrawn="1">
+          <p15:clr>
+            <a:srgbClr val="A4A3A4"/>
+          </p15:clr>
+        </p15:guide>
+      </p15:sldGuideLst>
+    </p:ext>
+  </p:extLst>
 </p:presentation>
 </file>
 
@@ -136,8 +152,8 @@
         </p:nvSpPr>
         <p:spPr>
           <a:xfrm>
-            <a:off x="205740" y="1221543"/>
-            <a:ext cx="2331720" cy="842882"/>
+            <a:off x="205740" y="1065213"/>
+            <a:ext cx="2331720" cy="735012"/>
           </a:xfrm>
         </p:spPr>
         <p:txBody>
@@ -164,8 +180,8 @@
         </p:nvSpPr>
         <p:spPr>
           <a:xfrm>
-            <a:off x="411480" y="2228268"/>
-            <a:ext cx="1920240" cy="1004905"/>
+            <a:off x="411480" y="1943100"/>
+            <a:ext cx="1920240" cy="876300"/>
           </a:xfrm>
         </p:spPr>
         <p:txBody>
@@ -289,7 +305,7 @@
             <a:fld id="{65051E0B-0E76-4265-9619-7EE30BCD6EBA}" type="datetimeFigureOut">
               <a:rPr lang="en-US" smtClean="0"/>
               <a:pPr/>
-              <a:t>5/16/2014</a:t>
+              <a:t>10/7/2016</a:t>
             </a:fld>
             <a:endParaRPr lang="en-US"/>
           </a:p>
@@ -456,7 +472,7 @@
             <a:fld id="{65051E0B-0E76-4265-9619-7EE30BCD6EBA}" type="datetimeFigureOut">
               <a:rPr lang="en-US" smtClean="0"/>
               <a:pPr/>
-              <a:t>5/16/2014</a:t>
+              <a:t>10/7/2016</a:t>
             </a:fld>
             <a:endParaRPr lang="en-US"/>
           </a:p>
@@ -542,8 +558,8 @@
         </p:nvSpPr>
         <p:spPr>
           <a:xfrm>
-            <a:off x="1193483" y="146549"/>
-            <a:ext cx="370047" cy="3132137"/>
+            <a:off x="1193485" y="127794"/>
+            <a:ext cx="370047" cy="2731294"/>
           </a:xfrm>
         </p:spPr>
         <p:txBody>
@@ -570,8 +586,8 @@
         </p:nvSpPr>
         <p:spPr>
           <a:xfrm>
-            <a:off x="82392" y="146549"/>
-            <a:ext cx="1065371" cy="3132137"/>
+            <a:off x="82394" y="127794"/>
+            <a:ext cx="1065371" cy="2731294"/>
           </a:xfrm>
         </p:spPr>
         <p:txBody>
@@ -633,7 +649,7 @@
             <a:fld id="{65051E0B-0E76-4265-9619-7EE30BCD6EBA}" type="datetimeFigureOut">
               <a:rPr lang="en-US" smtClean="0"/>
               <a:pPr/>
-              <a:t>5/16/2014</a:t>
+              <a:t>10/7/2016</a:t>
             </a:fld>
             <a:endParaRPr lang="en-US"/>
           </a:p>
@@ -800,7 +816,7 @@
             <a:fld id="{65051E0B-0E76-4265-9619-7EE30BCD6EBA}" type="datetimeFigureOut">
               <a:rPr lang="en-US" smtClean="0"/>
               <a:pPr/>
-              <a:t>5/16/2014</a:t>
+              <a:t>10/7/2016</a:t>
             </a:fld>
             <a:endParaRPr lang="en-US"/>
           </a:p>
@@ -886,8 +902,8 @@
         </p:nvSpPr>
         <p:spPr>
           <a:xfrm>
-            <a:off x="216694" y="2526827"/>
-            <a:ext cx="2331720" cy="780986"/>
+            <a:off x="216694" y="2203450"/>
+            <a:ext cx="2331720" cy="681038"/>
           </a:xfrm>
         </p:spPr>
         <p:txBody>
@@ -918,8 +934,8 @@
         </p:nvSpPr>
         <p:spPr>
           <a:xfrm>
-            <a:off x="216694" y="1666650"/>
-            <a:ext cx="2331720" cy="860177"/>
+            <a:off x="216694" y="1453356"/>
+            <a:ext cx="2331720" cy="750094"/>
           </a:xfrm>
         </p:spPr>
         <p:txBody>
@@ -1043,7 +1059,7 @@
             <a:fld id="{65051E0B-0E76-4265-9619-7EE30BCD6EBA}" type="datetimeFigureOut">
               <a:rPr lang="en-US" smtClean="0"/>
               <a:pPr/>
-              <a:t>5/16/2014</a:t>
+              <a:t>10/7/2016</a:t>
             </a:fld>
             <a:endParaRPr lang="en-US"/>
           </a:p>
@@ -1152,8 +1168,8 @@
         </p:nvSpPr>
         <p:spPr>
           <a:xfrm>
-            <a:off x="82392" y="856537"/>
-            <a:ext cx="717709" cy="2422149"/>
+            <a:off x="82394" y="746919"/>
+            <a:ext cx="717709" cy="2112169"/>
           </a:xfrm>
         </p:spPr>
         <p:txBody>
@@ -1237,8 +1253,8 @@
         </p:nvSpPr>
         <p:spPr>
           <a:xfrm>
-            <a:off x="845820" y="856537"/>
-            <a:ext cx="717709" cy="2422149"/>
+            <a:off x="845822" y="746919"/>
+            <a:ext cx="717709" cy="2112169"/>
           </a:xfrm>
         </p:spPr>
         <p:txBody>
@@ -1328,7 +1344,7 @@
             <a:fld id="{65051E0B-0E76-4265-9619-7EE30BCD6EBA}" type="datetimeFigureOut">
               <a:rPr lang="en-US" smtClean="0"/>
               <a:pPr/>
-              <a:t>5/16/2014</a:t>
+              <a:t>10/7/2016</a:t>
             </a:fld>
             <a:endParaRPr lang="en-US"/>
           </a:p>
@@ -1414,8 +1430,8 @@
         </p:nvSpPr>
         <p:spPr>
           <a:xfrm>
-            <a:off x="137160" y="157472"/>
-            <a:ext cx="2468880" cy="655373"/>
+            <a:off x="137160" y="137319"/>
+            <a:ext cx="2468880" cy="571500"/>
           </a:xfrm>
         </p:spPr>
         <p:txBody>
@@ -1446,8 +1462,8 @@
         </p:nvSpPr>
         <p:spPr>
           <a:xfrm>
-            <a:off x="137160" y="880203"/>
-            <a:ext cx="1212057" cy="366826"/>
+            <a:off x="137162" y="767556"/>
+            <a:ext cx="1212057" cy="319881"/>
           </a:xfrm>
         </p:spPr>
         <p:txBody>
@@ -1511,8 +1527,8 @@
         </p:nvSpPr>
         <p:spPr>
           <a:xfrm>
-            <a:off x="137160" y="1247030"/>
-            <a:ext cx="1212057" cy="2265588"/>
+            <a:off x="137162" y="1087439"/>
+            <a:ext cx="1212057" cy="1975643"/>
           </a:xfrm>
         </p:spPr>
         <p:txBody>
@@ -1596,8 +1612,8 @@
         </p:nvSpPr>
         <p:spPr>
           <a:xfrm>
-            <a:off x="1393507" y="880203"/>
-            <a:ext cx="1212533" cy="366826"/>
+            <a:off x="1393507" y="767556"/>
+            <a:ext cx="1212533" cy="319881"/>
           </a:xfrm>
         </p:spPr>
         <p:txBody>
@@ -1661,8 +1677,8 @@
         </p:nvSpPr>
         <p:spPr>
           <a:xfrm>
-            <a:off x="1393507" y="1247030"/>
-            <a:ext cx="1212533" cy="2265588"/>
+            <a:off x="1393507" y="1087439"/>
+            <a:ext cx="1212533" cy="1975643"/>
           </a:xfrm>
         </p:spPr>
         <p:txBody>
@@ -1752,7 +1768,7 @@
             <a:fld id="{65051E0B-0E76-4265-9619-7EE30BCD6EBA}" type="datetimeFigureOut">
               <a:rPr lang="en-US" smtClean="0"/>
               <a:pPr/>
-              <a:t>5/16/2014</a:t>
+              <a:t>10/7/2016</a:t>
             </a:fld>
             <a:endParaRPr lang="en-US"/>
           </a:p>
@@ -1867,7 +1883,7 @@
             <a:fld id="{65051E0B-0E76-4265-9619-7EE30BCD6EBA}" type="datetimeFigureOut">
               <a:rPr lang="en-US" smtClean="0"/>
               <a:pPr/>
-              <a:t>5/16/2014</a:t>
+              <a:t>10/7/2016</a:t>
             </a:fld>
             <a:endParaRPr lang="en-US"/>
           </a:p>
@@ -1959,7 +1975,7 @@
             <a:fld id="{65051E0B-0E76-4265-9619-7EE30BCD6EBA}" type="datetimeFigureOut">
               <a:rPr lang="en-US" smtClean="0"/>
               <a:pPr/>
-              <a:t>5/16/2014</a:t>
+              <a:t>10/7/2016</a:t>
             </a:fld>
             <a:endParaRPr lang="en-US"/>
           </a:p>
@@ -2045,8 +2061,8 @@
         </p:nvSpPr>
         <p:spPr>
           <a:xfrm>
-            <a:off x="137160" y="156561"/>
-            <a:ext cx="902494" cy="666296"/>
+            <a:off x="137160" y="136524"/>
+            <a:ext cx="902494" cy="581025"/>
           </a:xfrm>
         </p:spPr>
         <p:txBody>
@@ -2077,8 +2093,8 @@
         </p:nvSpPr>
         <p:spPr>
           <a:xfrm>
-            <a:off x="1072515" y="156562"/>
-            <a:ext cx="1533525" cy="3356056"/>
+            <a:off x="1072517" y="136525"/>
+            <a:ext cx="1533525" cy="2926556"/>
           </a:xfrm>
         </p:spPr>
         <p:txBody>
@@ -2162,8 +2178,8 @@
         </p:nvSpPr>
         <p:spPr>
           <a:xfrm>
-            <a:off x="137160" y="822858"/>
-            <a:ext cx="902494" cy="2689760"/>
+            <a:off x="137160" y="717550"/>
+            <a:ext cx="902494" cy="2345531"/>
           </a:xfrm>
         </p:spPr>
         <p:txBody>
@@ -2233,7 +2249,7 @@
             <a:fld id="{65051E0B-0E76-4265-9619-7EE30BCD6EBA}" type="datetimeFigureOut">
               <a:rPr lang="en-US" smtClean="0"/>
               <a:pPr/>
-              <a:t>5/16/2014</a:t>
+              <a:t>10/7/2016</a:t>
             </a:fld>
             <a:endParaRPr lang="en-US"/>
           </a:p>
@@ -2319,8 +2335,8 @@
         </p:nvSpPr>
         <p:spPr>
           <a:xfrm>
-            <a:off x="537687" y="2752567"/>
-            <a:ext cx="1645920" cy="324956"/>
+            <a:off x="537687" y="2400300"/>
+            <a:ext cx="1645920" cy="283369"/>
           </a:xfrm>
         </p:spPr>
         <p:txBody>
@@ -2351,8 +2367,8 @@
         </p:nvSpPr>
         <p:spPr>
           <a:xfrm>
-            <a:off x="537687" y="351352"/>
-            <a:ext cx="1645920" cy="2359343"/>
+            <a:off x="537687" y="306387"/>
+            <a:ext cx="1645920" cy="2057400"/>
           </a:xfrm>
         </p:spPr>
         <p:txBody>
@@ -2412,8 +2428,8 @@
         </p:nvSpPr>
         <p:spPr>
           <a:xfrm>
-            <a:off x="537687" y="3077523"/>
-            <a:ext cx="1645920" cy="461492"/>
+            <a:off x="537687" y="2683670"/>
+            <a:ext cx="1645920" cy="402431"/>
           </a:xfrm>
         </p:spPr>
         <p:txBody>
@@ -2483,7 +2499,7 @@
             <a:fld id="{65051E0B-0E76-4265-9619-7EE30BCD6EBA}" type="datetimeFigureOut">
               <a:rPr lang="en-US" smtClean="0"/>
               <a:pPr/>
-              <a:t>5/16/2014</a:t>
+              <a:t>10/7/2016</a:t>
             </a:fld>
             <a:endParaRPr lang="en-US"/>
           </a:p>
@@ -2574,8 +2590,8 @@
         </p:nvSpPr>
         <p:spPr>
           <a:xfrm>
-            <a:off x="137160" y="157472"/>
-            <a:ext cx="2468880" cy="655373"/>
+            <a:off x="137160" y="137319"/>
+            <a:ext cx="2468880" cy="571500"/>
           </a:xfrm>
           <a:prstGeom prst="rect">
             <a:avLst/>
@@ -2607,8 +2623,8 @@
         </p:nvSpPr>
         <p:spPr>
           <a:xfrm>
-            <a:off x="137160" y="917523"/>
-            <a:ext cx="2468880" cy="2595095"/>
+            <a:off x="137160" y="800101"/>
+            <a:ext cx="2468880" cy="2262982"/>
           </a:xfrm>
           <a:prstGeom prst="rect">
             <a:avLst/>
@@ -2669,8 +2685,8 @@
         </p:nvSpPr>
         <p:spPr>
           <a:xfrm>
-            <a:off x="137160" y="3644603"/>
-            <a:ext cx="640080" cy="209355"/>
+            <a:off x="137160" y="3178177"/>
+            <a:ext cx="640080" cy="182562"/>
           </a:xfrm>
           <a:prstGeom prst="rect">
             <a:avLst/>
@@ -2693,7 +2709,7 @@
             <a:fld id="{65051E0B-0E76-4265-9619-7EE30BCD6EBA}" type="datetimeFigureOut">
               <a:rPr lang="en-US" smtClean="0"/>
               <a:pPr/>
-              <a:t>5/16/2014</a:t>
+              <a:t>10/7/2016</a:t>
             </a:fld>
             <a:endParaRPr lang="en-US"/>
           </a:p>
@@ -2711,8 +2727,8 @@
         </p:nvSpPr>
         <p:spPr>
           <a:xfrm>
-            <a:off x="937260" y="3644603"/>
-            <a:ext cx="868680" cy="209355"/>
+            <a:off x="937260" y="3178177"/>
+            <a:ext cx="868680" cy="182562"/>
           </a:xfrm>
           <a:prstGeom prst="rect">
             <a:avLst/>
@@ -2748,8 +2764,8 @@
         </p:nvSpPr>
         <p:spPr>
           <a:xfrm>
-            <a:off x="1965960" y="3644603"/>
-            <a:ext cx="640080" cy="209355"/>
+            <a:off x="1965960" y="3178177"/>
+            <a:ext cx="640080" cy="182562"/>
           </a:xfrm>
           <a:prstGeom prst="rect">
             <a:avLst/>
@@ -3074,8 +3090,8 @@
         </p:nvSpPr>
         <p:spPr>
           <a:xfrm>
-            <a:off x="0" y="643152"/>
-            <a:ext cx="2971800" cy="2814655"/>
+            <a:off x="34422" y="162933"/>
+            <a:ext cx="2667000" cy="3067032"/>
           </a:xfrm>
           <a:prstGeom prst="rect">
             <a:avLst/>
@@ -3093,12 +3109,43 @@
               </a:spcBef>
             </a:pPr>
             <a:r>
-              <a:rPr lang="en-US" sz="2200" dirty="0" smtClean="0">
-                <a:latin typeface="Courier New" pitchFamily="49" charset="0"/>
-                <a:cs typeface="Courier New" pitchFamily="49" charset="0"/>
+              <a:rPr lang="en-US" sz="2200" dirty="0">
+                <a:latin typeface="Times New Roman" panose="02020603050405020304" pitchFamily="18" charset="0"/>
+                <a:cs typeface="Times New Roman" panose="02020603050405020304" pitchFamily="18" charset="0"/>
               </a:rPr>
-              <a:t> a = 0;</a:t>
-            </a:r>
+              <a:t> </a:t>
+            </a:r>
+            <a:r>
+              <a:rPr lang="en-US" sz="2400" dirty="0">
+                <a:latin typeface="Times New Roman" panose="02020603050405020304" pitchFamily="18" charset="0"/>
+                <a:cs typeface="Times New Roman" panose="02020603050405020304" pitchFamily="18" charset="0"/>
+              </a:rPr>
+              <a:t>a = 0;</a:t>
+            </a:r>
+            <a:r>
+              <a:rPr lang="en-US" altLang="en-US" sz="2400" i="1" dirty="0">
+                <a:solidFill>
+                  <a:srgbClr val="408080"/>
+                </a:solidFill>
+                <a:latin typeface="Times New Roman" panose="02020603050405020304" pitchFamily="18" charset="0"/>
+                <a:cs typeface="Times New Roman" panose="02020603050405020304" pitchFamily="18" charset="0"/>
+              </a:rPr>
+              <a:t> /* set up */</a:t>
+            </a:r>
+            <a:r>
+              <a:rPr lang="en-US" altLang="en-US" sz="2400" dirty="0">
+                <a:solidFill>
+                  <a:srgbClr val="000000"/>
+                </a:solidFill>
+                <a:latin typeface="Times New Roman" panose="02020603050405020304" pitchFamily="18" charset="0"/>
+                <a:cs typeface="Times New Roman" panose="02020603050405020304" pitchFamily="18" charset="0"/>
+              </a:rPr>
+              <a:t> </a:t>
+            </a:r>
+            <a:endParaRPr lang="en-US" sz="2400" dirty="0">
+              <a:latin typeface="Times New Roman" panose="02020603050405020304" pitchFamily="18" charset="0"/>
+              <a:cs typeface="Times New Roman" panose="02020603050405020304" pitchFamily="18" charset="0"/>
+            </a:endParaRPr>
           </a:p>
           <a:p>
             <a:pPr marL="143017" indent="-143017">
@@ -3107,25 +3154,11 @@
               </a:spcBef>
             </a:pPr>
             <a:r>
-              <a:rPr lang="en-US" sz="2200" dirty="0" smtClean="0">
-                <a:latin typeface="Courier New" pitchFamily="49" charset="0"/>
-                <a:cs typeface="Courier New" pitchFamily="49" charset="0"/>
+              <a:rPr lang="en-US" sz="2400" dirty="0">
+                <a:latin typeface="Times New Roman" panose="02020603050405020304" pitchFamily="18" charset="0"/>
+                <a:cs typeface="Times New Roman" panose="02020603050405020304" pitchFamily="18" charset="0"/>
               </a:rPr>
-              <a:t> </a:t>
-            </a:r>
-            <a:r>
-              <a:rPr lang="en-US" sz="2200" dirty="0" err="1" smtClean="0">
-                <a:latin typeface="Courier New" pitchFamily="49" charset="0"/>
-                <a:cs typeface="Courier New" pitchFamily="49" charset="0"/>
-              </a:rPr>
-              <a:t>i</a:t>
-            </a:r>
-            <a:r>
-              <a:rPr lang="en-US" sz="2200" dirty="0" smtClean="0">
-                <a:latin typeface="Courier New" pitchFamily="49" charset="0"/>
-                <a:cs typeface="Courier New" pitchFamily="49" charset="0"/>
-              </a:rPr>
-              <a:t> = 0;</a:t>
+              <a:t> i = 0;</a:t>
             </a:r>
           </a:p>
           <a:p>
@@ -3135,46 +3168,21 @@
               </a:spcBef>
             </a:pPr>
             <a:r>
-              <a:rPr lang="en-US" sz="2200" b="1" smtClean="0">
-                <a:latin typeface="Courier New" pitchFamily="49" charset="0"/>
-                <a:cs typeface="Courier New" pitchFamily="49" charset="0"/>
+              <a:rPr lang="en-US" sz="2400" b="1" dirty="0">
+                <a:solidFill>
+                  <a:srgbClr val="008000"/>
+                </a:solidFill>
+                <a:latin typeface="Times New Roman" panose="02020603050405020304" pitchFamily="18" charset="0"/>
+                <a:cs typeface="Times New Roman" panose="02020603050405020304" pitchFamily="18" charset="0"/>
               </a:rPr>
-              <a:t> </a:t>
-            </a:r>
-            <a:r>
-              <a:rPr lang="en-US" sz="2200" b="1" smtClean="0">
-                <a:latin typeface="Courier New" pitchFamily="49" charset="0"/>
-                <a:cs typeface="Courier New" pitchFamily="49" charset="0"/>
+              <a:t> While </a:t>
+            </a:r>
+            <a:r>
+              <a:rPr lang="en-US" sz="2400" dirty="0">
+                <a:latin typeface="Times New Roman" panose="02020603050405020304" pitchFamily="18" charset="0"/>
+                <a:cs typeface="Times New Roman" panose="02020603050405020304" pitchFamily="18" charset="0"/>
               </a:rPr>
-              <a:t>While</a:t>
-            </a:r>
-            <a:r>
-              <a:rPr lang="en-US" sz="2200" smtClean="0">
-                <a:latin typeface="Courier New" pitchFamily="49" charset="0"/>
-                <a:cs typeface="Courier New" pitchFamily="49" charset="0"/>
-              </a:rPr>
-              <a:t>(</a:t>
-            </a:r>
-            <a:r>
-              <a:rPr lang="en-US" sz="2200" dirty="0" err="1" smtClean="0">
-                <a:latin typeface="Courier New" pitchFamily="49" charset="0"/>
-                <a:cs typeface="Courier New" pitchFamily="49" charset="0"/>
-              </a:rPr>
-              <a:t>a</a:t>
-            </a:r>
-            <a:r>
-              <a:rPr lang="en-US" sz="2200" smtClean="0">
-                <a:latin typeface="Courier New" pitchFamily="49" charset="0"/>
-                <a:cs typeface="Courier New" pitchFamily="49" charset="0"/>
-              </a:rPr>
-              <a:t> </a:t>
-            </a:r>
-            <a:r>
-              <a:rPr lang="en-US" sz="2200" dirty="0" smtClean="0">
-                <a:latin typeface="Courier New" pitchFamily="49" charset="0"/>
-                <a:cs typeface="Courier New" pitchFamily="49" charset="0"/>
-              </a:rPr>
-              <a:t>&lt; N){</a:t>
+              <a:t>(a &lt; N) {</a:t>
             </a:r>
           </a:p>
           <a:p>
@@ -3184,9 +3192,9 @@
               </a:spcBef>
             </a:pPr>
             <a:r>
-              <a:rPr lang="en-US" sz="2200" dirty="0" smtClean="0">
-                <a:latin typeface="Courier New" pitchFamily="49" charset="0"/>
-                <a:cs typeface="Courier New" pitchFamily="49" charset="0"/>
+              <a:rPr lang="en-US" sz="2400" dirty="0">
+                <a:latin typeface="Times New Roman" panose="02020603050405020304" pitchFamily="18" charset="0"/>
+                <a:cs typeface="Times New Roman" panose="02020603050405020304" pitchFamily="18" charset="0"/>
               </a:rPr>
               <a:t>     a = a + 2; </a:t>
             </a:r>
@@ -3198,25 +3206,11 @@
               </a:spcBef>
             </a:pPr>
             <a:r>
-              <a:rPr lang="en-US" sz="2200" dirty="0" smtClean="0">
-                <a:latin typeface="Courier New" pitchFamily="49" charset="0"/>
-                <a:cs typeface="Courier New" pitchFamily="49" charset="0"/>
+              <a:rPr lang="en-US" sz="2400" dirty="0">
+                <a:latin typeface="Times New Roman" panose="02020603050405020304" pitchFamily="18" charset="0"/>
+                <a:cs typeface="Times New Roman" panose="02020603050405020304" pitchFamily="18" charset="0"/>
               </a:rPr>
-              <a:t>     c = </a:t>
-            </a:r>
-            <a:r>
-              <a:rPr lang="en-US" sz="2200" dirty="0" err="1" smtClean="0">
-                <a:latin typeface="Courier New" pitchFamily="49" charset="0"/>
-                <a:cs typeface="Courier New" pitchFamily="49" charset="0"/>
-              </a:rPr>
-              <a:t>i</a:t>
-            </a:r>
-            <a:r>
-              <a:rPr lang="en-US" sz="2200" dirty="0" smtClean="0">
-                <a:latin typeface="Courier New" pitchFamily="49" charset="0"/>
-                <a:cs typeface="Courier New" pitchFamily="49" charset="0"/>
-              </a:rPr>
-              <a:t> + 3;</a:t>
+              <a:t>     c = i + 3;</a:t>
             </a:r>
           </a:p>
           <a:p>
@@ -3226,25 +3220,11 @@
               </a:spcBef>
             </a:pPr>
             <a:r>
-              <a:rPr lang="en-US" sz="2200" dirty="0" smtClean="0">
-                <a:latin typeface="Courier New" pitchFamily="49" charset="0"/>
-                <a:cs typeface="Courier New" pitchFamily="49" charset="0"/>
+              <a:rPr lang="en-US" sz="2400" dirty="0">
+                <a:latin typeface="Times New Roman" panose="02020603050405020304" pitchFamily="18" charset="0"/>
+                <a:cs typeface="Times New Roman" panose="02020603050405020304" pitchFamily="18" charset="0"/>
               </a:rPr>
-              <a:t>     </a:t>
-            </a:r>
-            <a:r>
-              <a:rPr lang="en-US" sz="2200" dirty="0" err="1" smtClean="0">
-                <a:latin typeface="Courier New" pitchFamily="49" charset="0"/>
-                <a:cs typeface="Courier New" pitchFamily="49" charset="0"/>
-              </a:rPr>
-              <a:t>i</a:t>
-            </a:r>
-            <a:r>
-              <a:rPr lang="en-US" sz="2200" dirty="0" smtClean="0">
-                <a:latin typeface="Courier New" pitchFamily="49" charset="0"/>
-                <a:cs typeface="Courier New" pitchFamily="49" charset="0"/>
-              </a:rPr>
-              <a:t> = a + c;</a:t>
+              <a:t>     i = a + c;</a:t>
             </a:r>
           </a:p>
           <a:p>
@@ -3254,15 +3234,15 @@
               </a:spcBef>
             </a:pPr>
             <a:r>
-              <a:rPr lang="en-US" sz="2200" dirty="0" smtClean="0">
-                <a:latin typeface="Courier New" pitchFamily="49" charset="0"/>
-                <a:cs typeface="Courier New" pitchFamily="49" charset="0"/>
+              <a:rPr lang="en-US" sz="2400" dirty="0">
+                <a:latin typeface="Times New Roman" panose="02020603050405020304" pitchFamily="18" charset="0"/>
+                <a:cs typeface="Times New Roman" panose="02020603050405020304" pitchFamily="18" charset="0"/>
               </a:rPr>
               <a:t> }</a:t>
             </a:r>
-            <a:endParaRPr lang="en-US" sz="2200" dirty="0">
-              <a:latin typeface="Courier New" pitchFamily="49" charset="0"/>
-              <a:cs typeface="Courier New" pitchFamily="49" charset="0"/>
+            <a:endParaRPr lang="en-US" sz="2400" dirty="0">
+              <a:latin typeface="Times New Roman" panose="02020603050405020304" pitchFamily="18" charset="0"/>
+              <a:cs typeface="Times New Roman" panose="02020603050405020304" pitchFamily="18" charset="0"/>
             </a:endParaRPr>
           </a:p>
         </p:txBody>
@@ -3275,14 +3255,14 @@
         </p:nvSpPr>
         <p:spPr>
           <a:xfrm>
-            <a:off x="0" y="594519"/>
-            <a:ext cx="2743200" cy="2895600"/>
+            <a:off x="34422" y="114300"/>
+            <a:ext cx="2667000" cy="3200400"/>
           </a:xfrm>
           <a:prstGeom prst="rect">
             <a:avLst/>
           </a:prstGeom>
           <a:noFill/>
-          <a:ln w="38100">
+          <a:ln w="12700">
             <a:solidFill>
               <a:schemeClr val="tx1"/>
             </a:solidFill>

</xml_diff>